<commit_message>
Add ppt and Report
</commit_message>
<xml_diff>
--- a/PPT & Report/Out Patient Department .pptx
+++ b/PPT & Report/Out Patient Department .pptx
@@ -455,7 +455,7 @@
           <a:p>
             <a:fld id="{6F0902E1-8375-41CA-B55E-2EB25C2ADF07}" type="datetimeFigureOut">
               <a:rPr lang="en-IN" smtClean="0"/>
-              <a:t>25-11-2022</a:t>
+              <a:t>15-03-2023</a:t>
             </a:fld>
             <a:endParaRPr lang="en-IN"/>
           </a:p>
@@ -869,7 +869,7 @@
           <a:p>
             <a:fld id="{6F0902E1-8375-41CA-B55E-2EB25C2ADF07}" type="datetimeFigureOut">
               <a:rPr lang="en-IN" smtClean="0"/>
-              <a:t>25-11-2022</a:t>
+              <a:t>15-03-2023</a:t>
             </a:fld>
             <a:endParaRPr lang="en-IN"/>
           </a:p>
@@ -1205,7 +1205,7 @@
           <a:p>
             <a:fld id="{6F0902E1-8375-41CA-B55E-2EB25C2ADF07}" type="datetimeFigureOut">
               <a:rPr lang="en-IN" smtClean="0"/>
-              <a:t>25-11-2022</a:t>
+              <a:t>15-03-2023</a:t>
             </a:fld>
             <a:endParaRPr lang="en-IN"/>
           </a:p>
@@ -1610,7 +1610,7 @@
           <a:p>
             <a:fld id="{6F0902E1-8375-41CA-B55E-2EB25C2ADF07}" type="datetimeFigureOut">
               <a:rPr lang="en-IN" smtClean="0"/>
-              <a:t>25-11-2022</a:t>
+              <a:t>15-03-2023</a:t>
             </a:fld>
             <a:endParaRPr lang="en-IN"/>
           </a:p>
@@ -2178,7 +2178,7 @@
           <a:p>
             <a:fld id="{6F0902E1-8375-41CA-B55E-2EB25C2ADF07}" type="datetimeFigureOut">
               <a:rPr lang="en-IN" smtClean="0"/>
-              <a:t>25-11-2022</a:t>
+              <a:t>15-03-2023</a:t>
             </a:fld>
             <a:endParaRPr lang="en-IN"/>
           </a:p>
@@ -2859,7 +2859,7 @@
           <a:p>
             <a:fld id="{6F0902E1-8375-41CA-B55E-2EB25C2ADF07}" type="datetimeFigureOut">
               <a:rPr lang="en-IN" smtClean="0"/>
-              <a:t>25-11-2022</a:t>
+              <a:t>15-03-2023</a:t>
             </a:fld>
             <a:endParaRPr lang="en-IN"/>
           </a:p>
@@ -3772,7 +3772,7 @@
           <a:p>
             <a:fld id="{6F0902E1-8375-41CA-B55E-2EB25C2ADF07}" type="datetimeFigureOut">
               <a:rPr lang="en-IN" smtClean="0"/>
-              <a:t>25-11-2022</a:t>
+              <a:t>15-03-2023</a:t>
             </a:fld>
             <a:endParaRPr lang="en-IN"/>
           </a:p>
@@ -4085,7 +4085,7 @@
           <a:p>
             <a:fld id="{6F0902E1-8375-41CA-B55E-2EB25C2ADF07}" type="datetimeFigureOut">
               <a:rPr lang="en-IN" smtClean="0"/>
-              <a:t>25-11-2022</a:t>
+              <a:t>15-03-2023</a:t>
             </a:fld>
             <a:endParaRPr lang="en-IN"/>
           </a:p>
@@ -4349,7 +4349,7 @@
           <a:p>
             <a:fld id="{6F0902E1-8375-41CA-B55E-2EB25C2ADF07}" type="datetimeFigureOut">
               <a:rPr lang="en-IN" smtClean="0"/>
-              <a:t>25-11-2022</a:t>
+              <a:t>15-03-2023</a:t>
             </a:fld>
             <a:endParaRPr lang="en-IN"/>
           </a:p>
@@ -4672,7 +4672,7 @@
           <a:p>
             <a:fld id="{6F0902E1-8375-41CA-B55E-2EB25C2ADF07}" type="datetimeFigureOut">
               <a:rPr lang="en-IN" smtClean="0"/>
-              <a:t>25-11-2022</a:t>
+              <a:t>15-03-2023</a:t>
             </a:fld>
             <a:endParaRPr lang="en-IN"/>
           </a:p>
@@ -5061,7 +5061,7 @@
           <a:p>
             <a:fld id="{6F0902E1-8375-41CA-B55E-2EB25C2ADF07}" type="datetimeFigureOut">
               <a:rPr lang="en-IN" smtClean="0"/>
-              <a:t>25-11-2022</a:t>
+              <a:t>15-03-2023</a:t>
             </a:fld>
             <a:endParaRPr lang="en-IN"/>
           </a:p>
@@ -5437,7 +5437,7 @@
           <a:p>
             <a:fld id="{6F0902E1-8375-41CA-B55E-2EB25C2ADF07}" type="datetimeFigureOut">
               <a:rPr lang="en-IN" smtClean="0"/>
-              <a:t>25-11-2022</a:t>
+              <a:t>15-03-2023</a:t>
             </a:fld>
             <a:endParaRPr lang="en-IN"/>
           </a:p>
@@ -5943,7 +5943,7 @@
           <a:p>
             <a:fld id="{6F0902E1-8375-41CA-B55E-2EB25C2ADF07}" type="datetimeFigureOut">
               <a:rPr lang="en-IN" smtClean="0"/>
-              <a:t>25-11-2022</a:t>
+              <a:t>15-03-2023</a:t>
             </a:fld>
             <a:endParaRPr lang="en-IN"/>
           </a:p>
@@ -6200,7 +6200,7 @@
           <a:p>
             <a:fld id="{6F0902E1-8375-41CA-B55E-2EB25C2ADF07}" type="datetimeFigureOut">
               <a:rPr lang="en-IN" smtClean="0"/>
-              <a:t>25-11-2022</a:t>
+              <a:t>15-03-2023</a:t>
             </a:fld>
             <a:endParaRPr lang="en-IN"/>
           </a:p>
@@ -6363,7 +6363,7 @@
           <a:p>
             <a:fld id="{6F0902E1-8375-41CA-B55E-2EB25C2ADF07}" type="datetimeFigureOut">
               <a:rPr lang="en-IN" smtClean="0"/>
-              <a:t>25-11-2022</a:t>
+              <a:t>15-03-2023</a:t>
             </a:fld>
             <a:endParaRPr lang="en-IN"/>
           </a:p>
@@ -6753,7 +6753,7 @@
           <a:p>
             <a:fld id="{6F0902E1-8375-41CA-B55E-2EB25C2ADF07}" type="datetimeFigureOut">
               <a:rPr lang="en-IN" smtClean="0"/>
-              <a:t>25-11-2022</a:t>
+              <a:t>15-03-2023</a:t>
             </a:fld>
             <a:endParaRPr lang="en-IN"/>
           </a:p>
@@ -7162,7 +7162,7 @@
           <a:p>
             <a:fld id="{6F0902E1-8375-41CA-B55E-2EB25C2ADF07}" type="datetimeFigureOut">
               <a:rPr lang="en-IN" smtClean="0"/>
-              <a:t>25-11-2022</a:t>
+              <a:t>15-03-2023</a:t>
             </a:fld>
             <a:endParaRPr lang="en-IN"/>
           </a:p>
@@ -7406,7 +7406,7 @@
           <a:p>
             <a:fld id="{6F0902E1-8375-41CA-B55E-2EB25C2ADF07}" type="datetimeFigureOut">
               <a:rPr lang="en-IN" smtClean="0"/>
-              <a:t>25-11-2022</a:t>
+              <a:t>15-03-2023</a:t>
             </a:fld>
             <a:endParaRPr lang="en-IN"/>
           </a:p>
@@ -7930,8 +7930,8 @@
         </p:nvSpPr>
         <p:spPr>
           <a:xfrm>
-            <a:off x="7251864" y="4627724"/>
-            <a:ext cx="4645497" cy="1938992"/>
+            <a:off x="9573208" y="5286766"/>
+            <a:ext cx="2324153" cy="830997"/>
           </a:xfrm>
           <a:prstGeom prst="rect">
             <a:avLst/>
@@ -7959,7 +7959,7 @@
                   </a:outerShdw>
                 </a:effectLst>
               </a:rPr>
-              <a:t>AKHILESH KUMAR MISHRA (053)</a:t>
+              <a:t>SURYANSH(018)</a:t>
             </a:r>
           </a:p>
           <a:p>
@@ -7980,76 +7980,6 @@
               </a:rPr>
               <a:t>ASHISH (029)</a:t>
             </a:r>
-          </a:p>
-          <a:p>
-            <a:pPr algn="r"/>
-            <a:r>
-              <a:rPr lang="en-US" sz="2400" b="0" cap="none" spc="0" dirty="0">
-                <a:ln w="0"/>
-                <a:solidFill>
-                  <a:schemeClr val="bg1"/>
-                </a:solidFill>
-                <a:effectLst>
-                  <a:outerShdw blurRad="38100" dist="19050" dir="2700000" algn="tl" rotWithShape="0">
-                    <a:schemeClr val="dk1">
-                      <a:alpha val="40000"/>
-                    </a:schemeClr>
-                  </a:outerShdw>
-                </a:effectLst>
-              </a:rPr>
-              <a:t>ANGSHUMAN PAL (105)</a:t>
-            </a:r>
-          </a:p>
-          <a:p>
-            <a:pPr algn="r"/>
-            <a:r>
-              <a:rPr lang="en-US" sz="2400" dirty="0">
-                <a:ln w="0"/>
-                <a:solidFill>
-                  <a:schemeClr val="bg1"/>
-                </a:solidFill>
-                <a:effectLst>
-                  <a:outerShdw blurRad="38100" dist="19050" dir="2700000" algn="tl" rotWithShape="0">
-                    <a:schemeClr val="dk1">
-                      <a:alpha val="40000"/>
-                    </a:schemeClr>
-                  </a:outerShdw>
-                </a:effectLst>
-              </a:rPr>
-              <a:t>SAURAV KUMAR (109)</a:t>
-            </a:r>
-          </a:p>
-          <a:p>
-            <a:pPr algn="r"/>
-            <a:r>
-              <a:rPr lang="en-US" sz="2400" b="0" cap="none" spc="0" dirty="0">
-                <a:ln w="0"/>
-                <a:solidFill>
-                  <a:schemeClr val="bg1"/>
-                </a:solidFill>
-                <a:effectLst>
-                  <a:outerShdw blurRad="38100" dist="19050" dir="2700000" algn="tl" rotWithShape="0">
-                    <a:schemeClr val="dk1">
-                      <a:alpha val="40000"/>
-                    </a:schemeClr>
-                  </a:outerShdw>
-                </a:effectLst>
-              </a:rPr>
-              <a:t>RISHAV KUMAR SINGH (052)</a:t>
-            </a:r>
-            <a:endParaRPr lang="en-US" sz="2800" b="0" cap="none" spc="0" dirty="0">
-              <a:ln w="0"/>
-              <a:solidFill>
-                <a:schemeClr val="bg1"/>
-              </a:solidFill>
-              <a:effectLst>
-                <a:outerShdw blurRad="38100" dist="19050" dir="2700000" algn="tl" rotWithShape="0">
-                  <a:schemeClr val="dk1">
-                    <a:alpha val="40000"/>
-                  </a:schemeClr>
-                </a:outerShdw>
-              </a:effectLst>
-            </a:endParaRPr>
           </a:p>
         </p:txBody>
       </p:sp>

</xml_diff>